<commit_message>
Updated Cincy Deliver talk.
</commit_message>
<xml_diff>
--- a/Presentations/2024 Presentations/Accessibility Testing with Screen Reader - Cincy Deliver 2024.pptx
+++ b/Presentations/2024 Presentations/Accessibility Testing with Screen Reader - Cincy Deliver 2024.pptx
@@ -813,6 +813,13 @@
           <a:bodyPr/>
           <a:lstStyle/>
           <a:p>
+            <a:pPr defTabSz="941923"/>
+            <a:r>
+              <a:rPr lang="en-US" dirty="0"/>
+              <a:t>Azure Vision Studio - https://portal.vision.cognitive.azure.com/demo/image-captioning</a:t>
+            </a:r>
+          </a:p>
+          <a:p>
             <a:endParaRPr lang="en-US" dirty="0"/>
           </a:p>
         </p:txBody>
@@ -834,7 +841,7 @@
           <a:p>
             <a:fld id="{DD82C05A-7A07-4286-AA18-B883C0AF9A3B}" type="slidenum">
               <a:rPr lang="en-US" smtClean="0"/>
-              <a:t>11</a:t>
+              <a:t>10</a:t>
             </a:fld>
             <a:endParaRPr lang="en-US" dirty="0"/>
           </a:p>
@@ -843,7 +850,7 @@
     </p:spTree>
     <p:extLst>
       <p:ext uri="{BB962C8B-B14F-4D97-AF65-F5344CB8AC3E}">
-        <p14:creationId xmlns:p14="http://schemas.microsoft.com/office/powerpoint/2010/main" val="3124733408"/>
+        <p14:creationId xmlns:p14="http://schemas.microsoft.com/office/powerpoint/2010/main" val="3221064947"/>
       </p:ext>
     </p:extLst>
   </p:cSld>
@@ -918,7 +925,7 @@
           <a:p>
             <a:fld id="{DD82C05A-7A07-4286-AA18-B883C0AF9A3B}" type="slidenum">
               <a:rPr lang="en-US" smtClean="0"/>
-              <a:t>12</a:t>
+              <a:t>11</a:t>
             </a:fld>
             <a:endParaRPr lang="en-US" dirty="0"/>
           </a:p>
@@ -927,7 +934,7 @@
     </p:spTree>
     <p:extLst>
       <p:ext uri="{BB962C8B-B14F-4D97-AF65-F5344CB8AC3E}">
-        <p14:creationId xmlns:p14="http://schemas.microsoft.com/office/powerpoint/2010/main" val="2582610964"/>
+        <p14:creationId xmlns:p14="http://schemas.microsoft.com/office/powerpoint/2010/main" val="3124733408"/>
       </p:ext>
     </p:extLst>
   </p:cSld>
@@ -1002,7 +1009,7 @@
           <a:p>
             <a:fld id="{DD82C05A-7A07-4286-AA18-B883C0AF9A3B}" type="slidenum">
               <a:rPr lang="en-US" smtClean="0"/>
-              <a:t>13</a:t>
+              <a:t>12</a:t>
             </a:fld>
             <a:endParaRPr lang="en-US" dirty="0"/>
           </a:p>
@@ -1011,7 +1018,7 @@
     </p:spTree>
     <p:extLst>
       <p:ext uri="{BB962C8B-B14F-4D97-AF65-F5344CB8AC3E}">
-        <p14:creationId xmlns:p14="http://schemas.microsoft.com/office/powerpoint/2010/main" val="1266515495"/>
+        <p14:creationId xmlns:p14="http://schemas.microsoft.com/office/powerpoint/2010/main" val="2582610964"/>
       </p:ext>
     </p:extLst>
   </p:cSld>
@@ -1086,6 +1093,90 @@
           <a:p>
             <a:fld id="{DD82C05A-7A07-4286-AA18-B883C0AF9A3B}" type="slidenum">
               <a:rPr lang="en-US" smtClean="0"/>
+              <a:t>13</a:t>
+            </a:fld>
+            <a:endParaRPr lang="en-US" dirty="0"/>
+          </a:p>
+        </p:txBody>
+      </p:sp>
+    </p:spTree>
+    <p:extLst>
+      <p:ext uri="{BB962C8B-B14F-4D97-AF65-F5344CB8AC3E}">
+        <p14:creationId xmlns:p14="http://schemas.microsoft.com/office/powerpoint/2010/main" val="1266515495"/>
+      </p:ext>
+    </p:extLst>
+  </p:cSld>
+  <p:clrMapOvr>
+    <a:masterClrMapping/>
+  </p:clrMapOvr>
+</p:notes>
+</file>
+
+<file path=ppt/notesSlides/notesSlide14.xml><?xml version="1.0" encoding="utf-8"?>
+<p:notes xmlns:a="http://schemas.openxmlformats.org/drawingml/2006/main" xmlns:r="http://schemas.openxmlformats.org/officeDocument/2006/relationships" xmlns:p="http://schemas.openxmlformats.org/presentationml/2006/main">
+  <p:cSld>
+    <p:spTree>
+      <p:nvGrpSpPr>
+        <p:cNvPr id="1" name=""/>
+        <p:cNvGrpSpPr/>
+        <p:nvPr/>
+      </p:nvGrpSpPr>
+      <p:grpSpPr>
+        <a:xfrm>
+          <a:off x="0" y="0"/>
+          <a:ext cx="0" cy="0"/>
+          <a:chOff x="0" y="0"/>
+          <a:chExt cx="0" cy="0"/>
+        </a:xfrm>
+      </p:grpSpPr>
+      <p:sp>
+        <p:nvSpPr>
+          <p:cNvPr id="2" name="Slide Image Placeholder 1"/>
+          <p:cNvSpPr>
+            <a:spLocks noGrp="1" noRot="1" noChangeAspect="1"/>
+          </p:cNvSpPr>
+          <p:nvPr>
+            <p:ph type="sldImg"/>
+          </p:nvPr>
+        </p:nvSpPr>
+        <p:spPr/>
+      </p:sp>
+      <p:sp>
+        <p:nvSpPr>
+          <p:cNvPr id="3" name="Notes Placeholder 2"/>
+          <p:cNvSpPr>
+            <a:spLocks noGrp="1"/>
+          </p:cNvSpPr>
+          <p:nvPr>
+            <p:ph type="body" idx="1"/>
+          </p:nvPr>
+        </p:nvSpPr>
+        <p:spPr/>
+        <p:txBody>
+          <a:bodyPr/>
+          <a:lstStyle/>
+          <a:p>
+            <a:endParaRPr lang="en-US" dirty="0"/>
+          </a:p>
+        </p:txBody>
+      </p:sp>
+      <p:sp>
+        <p:nvSpPr>
+          <p:cNvPr id="4" name="Slide Number Placeholder 3"/>
+          <p:cNvSpPr>
+            <a:spLocks noGrp="1"/>
+          </p:cNvSpPr>
+          <p:nvPr>
+            <p:ph type="sldNum" sz="quarter" idx="5"/>
+          </p:nvPr>
+        </p:nvSpPr>
+        <p:spPr/>
+        <p:txBody>
+          <a:bodyPr/>
+          <a:lstStyle/>
+          <a:p>
+            <a:fld id="{DD82C05A-7A07-4286-AA18-B883C0AF9A3B}" type="slidenum">
+              <a:rPr lang="en-US" smtClean="0"/>
               <a:t>14</a:t>
             </a:fld>
             <a:endParaRPr lang="en-US" dirty="0"/>
@@ -1105,7 +1196,7 @@
 </p:notes>
 </file>
 
-<file path=ppt/notesSlides/notesSlide14.xml><?xml version="1.0" encoding="utf-8"?>
+<file path=ppt/notesSlides/notesSlide15.xml><?xml version="1.0" encoding="utf-8"?>
 <p:notes xmlns:a="http://schemas.openxmlformats.org/drawingml/2006/main" xmlns:r="http://schemas.openxmlformats.org/officeDocument/2006/relationships" xmlns:p="http://schemas.openxmlformats.org/presentationml/2006/main">
   <p:cSld>
     <p:spTree>
@@ -1233,7 +1324,7 @@
           <a:bodyPr/>
           <a:lstStyle/>
           <a:p>
-            <a:endParaRPr lang="en-US" dirty="0"/>
+            <a:endParaRPr lang="en-US"/>
           </a:p>
         </p:txBody>
       </p:sp>
@@ -1254,7 +1345,7 @@
           <a:p>
             <a:fld id="{DD82C05A-7A07-4286-AA18-B883C0AF9A3B}" type="slidenum">
               <a:rPr lang="en-US" smtClean="0"/>
-              <a:t>3</a:t>
+              <a:t>2</a:t>
             </a:fld>
             <a:endParaRPr lang="en-US" dirty="0"/>
           </a:p>
@@ -1263,7 +1354,7 @@
     </p:spTree>
     <p:extLst>
       <p:ext uri="{BB962C8B-B14F-4D97-AF65-F5344CB8AC3E}">
-        <p14:creationId xmlns:p14="http://schemas.microsoft.com/office/powerpoint/2010/main" val="1592544419"/>
+        <p14:creationId xmlns:p14="http://schemas.microsoft.com/office/powerpoint/2010/main" val="820749652"/>
       </p:ext>
     </p:extLst>
   </p:cSld>
@@ -1338,7 +1429,7 @@
           <a:p>
             <a:fld id="{DD82C05A-7A07-4286-AA18-B883C0AF9A3B}" type="slidenum">
               <a:rPr lang="en-US" smtClean="0"/>
-              <a:t>4</a:t>
+              <a:t>3</a:t>
             </a:fld>
             <a:endParaRPr lang="en-US" dirty="0"/>
           </a:p>
@@ -1347,7 +1438,7 @@
     </p:spTree>
     <p:extLst>
       <p:ext uri="{BB962C8B-B14F-4D97-AF65-F5344CB8AC3E}">
-        <p14:creationId xmlns:p14="http://schemas.microsoft.com/office/powerpoint/2010/main" val="2271413804"/>
+        <p14:creationId xmlns:p14="http://schemas.microsoft.com/office/powerpoint/2010/main" val="1592544419"/>
       </p:ext>
     </p:extLst>
   </p:cSld>
@@ -1401,38 +1492,7 @@
           <a:bodyPr/>
           <a:lstStyle/>
           <a:p>
-            <a:r>
-              <a:rPr lang="en-US" dirty="0"/>
-              <a:t>These descriptions are very simplified for time. I go more in-depth on discussing them in my Introduction to Accessibility talk.</a:t>
-            </a:r>
-          </a:p>
-          <a:p>
-            <a:pPr marL="176611" indent="-176611">
-              <a:buFontTx/>
-              <a:buChar char="-"/>
-            </a:pPr>
-            <a:r>
-              <a:rPr lang="en-US" b="1" dirty="0"/>
-              <a:t>Accessibility</a:t>
-            </a:r>
-            <a:r>
-              <a:rPr lang="en-US" dirty="0"/>
-              <a:t> is just how well can facilities, content, features, processes, policies, etc. be used/followed by users of all abilities. With regards to digital content, is it flexible enough for people to use it with/without assistive technologies.</a:t>
-            </a:r>
-          </a:p>
-          <a:p>
-            <a:pPr marL="176611" indent="-176611">
-              <a:buFontTx/>
-              <a:buChar char="-"/>
-            </a:pPr>
-            <a:r>
-              <a:rPr lang="en-US" b="1" dirty="0"/>
-              <a:t>Disability</a:t>
-            </a:r>
-            <a:r>
-              <a:rPr lang="en-US" dirty="0"/>
-              <a:t> is most easily thought of as is the environment creating a barrier to certain groups of people that isn’t caused for other groups. In this case, we are not just looking at barriers caused to people with medical conditions, but also people who may be commonly visiting the content while in a state of distress, in an environment where they cannot easily hear audio cues, maybe viewing a screen in a very brightly/dimly lit environment, viewing while on a poor connection, etc.</a:t>
-            </a:r>
+            <a:endParaRPr lang="en-US" dirty="0"/>
           </a:p>
         </p:txBody>
       </p:sp>
@@ -1453,7 +1513,7 @@
           <a:p>
             <a:fld id="{DD82C05A-7A07-4286-AA18-B883C0AF9A3B}" type="slidenum">
               <a:rPr lang="en-US" smtClean="0"/>
-              <a:t>5</a:t>
+              <a:t>4</a:t>
             </a:fld>
             <a:endParaRPr lang="en-US" dirty="0"/>
           </a:p>
@@ -1462,7 +1522,7 @@
     </p:spTree>
     <p:extLst>
       <p:ext uri="{BB962C8B-B14F-4D97-AF65-F5344CB8AC3E}">
-        <p14:creationId xmlns:p14="http://schemas.microsoft.com/office/powerpoint/2010/main" val="2208424147"/>
+        <p14:creationId xmlns:p14="http://schemas.microsoft.com/office/powerpoint/2010/main" val="2271413804"/>
       </p:ext>
     </p:extLst>
   </p:cSld>
@@ -1517,204 +1577,36 @@
           <a:lstStyle/>
           <a:p>
             <a:r>
-              <a:rPr lang="en-US" b="0" dirty="0"/>
-              <a:t>To that end we are looking at how accurately, clearly, and consistently the content is communicated.</a:t>
+              <a:rPr lang="en-US" dirty="0"/>
+              <a:t>These descriptions are very simplified for time. I go more in-depth on discussing them in my Introduction to Accessibility talk.</a:t>
             </a:r>
           </a:p>
           <a:p>
-            <a:r>
-              <a:rPr lang="en-US" b="0" dirty="0"/>
-              <a:t>Some of what we are looking at, include:</a:t>
-            </a:r>
-          </a:p>
-          <a:p>
             <a:pPr marL="176611" indent="-176611">
-              <a:buFont typeface="Arial" panose="020B0604020202020204" pitchFamily="34" charset="0"/>
-              <a:buChar char="•"/>
+              <a:buFontTx/>
+              <a:buChar char="-"/>
             </a:pPr>
             <a:r>
-              <a:rPr lang="en-US" b="0" dirty="0"/>
-              <a:t>Structure </a:t>
+              <a:rPr lang="en-US" b="1" dirty="0"/>
+              <a:t>Accessibility</a:t>
             </a:r>
-          </a:p>
-          <a:p>
-            <a:pPr marL="647572" lvl="1" indent="-176611">
-              <a:buFont typeface="Arial" panose="020B0604020202020204" pitchFamily="34" charset="0"/>
-              <a:buChar char="•"/>
+            <a:r>
+              <a:rPr lang="en-US" dirty="0"/>
+              <a:t> is just how well can facilities, content, features, processes, policies, etc. be used/followed by users of all abilities. With regards to digital content, is it flexible enough for people to use it with/without assistive technologies.</a:t>
+            </a:r>
+          </a:p>
+          <a:p>
+            <a:pPr marL="176611" indent="-176611">
+              <a:buFontTx/>
+              <a:buChar char="-"/>
             </a:pPr>
             <a:r>
-              <a:rPr lang="en-US" b="0" dirty="0"/>
-              <a:t>Headings</a:t>
+              <a:rPr lang="en-US" b="1" dirty="0"/>
+              <a:t>Disability</a:t>
             </a:r>
-          </a:p>
-          <a:p>
-            <a:pPr marL="647572" lvl="1" indent="-176611">
-              <a:buFont typeface="Arial" panose="020B0604020202020204" pitchFamily="34" charset="0"/>
-              <a:buChar char="•"/>
-            </a:pPr>
             <a:r>
-              <a:rPr lang="en-US" b="0" dirty="0"/>
-              <a:t>landmark regions (header, main, footer, nav, form, etc.)</a:t>
-            </a:r>
-          </a:p>
-          <a:p>
-            <a:pPr marL="176611" indent="-176611">
-              <a:buFont typeface="Arial" panose="020B0604020202020204" pitchFamily="34" charset="0"/>
-              <a:buChar char="•"/>
-            </a:pPr>
-            <a:r>
-              <a:rPr lang="en-US" b="0" dirty="0"/>
-              <a:t>Relationships</a:t>
-            </a:r>
-          </a:p>
-          <a:p>
-            <a:pPr marL="647572" lvl="1" indent="-176611">
-              <a:buFont typeface="Arial" panose="020B0604020202020204" pitchFamily="34" charset="0"/>
-              <a:buChar char="•"/>
-            </a:pPr>
-            <a:r>
-              <a:rPr lang="en-US" b="0" dirty="0"/>
-              <a:t>heading to its content</a:t>
-            </a:r>
-          </a:p>
-          <a:p>
-            <a:pPr marL="647572" lvl="1" indent="-176611">
-              <a:buFont typeface="Arial" panose="020B0604020202020204" pitchFamily="34" charset="0"/>
-              <a:buChar char="•"/>
-            </a:pPr>
-            <a:r>
-              <a:rPr lang="en-US" b="0" dirty="0"/>
-              <a:t>heading to other headings (not having to headings as H2s even though one is meant to be under the other)</a:t>
-            </a:r>
-          </a:p>
-          <a:p>
-            <a:pPr marL="647572" lvl="1" indent="-176611">
-              <a:buFont typeface="Arial" panose="020B0604020202020204" pitchFamily="34" charset="0"/>
-              <a:buChar char="•"/>
-            </a:pPr>
-            <a:r>
-              <a:rPr lang="en-US" b="0" dirty="0"/>
-              <a:t>label to its input</a:t>
-            </a:r>
-          </a:p>
-          <a:p>
-            <a:pPr marL="647572" lvl="1" indent="-176611">
-              <a:buFont typeface="Arial" panose="020B0604020202020204" pitchFamily="34" charset="0"/>
-              <a:buChar char="•"/>
-            </a:pPr>
-            <a:r>
-              <a:rPr lang="en-US" b="0" dirty="0"/>
-              <a:t>Lists (ordered vs unordered)</a:t>
-            </a:r>
-          </a:p>
-          <a:p>
-            <a:pPr marL="176611" indent="-176611">
-              <a:buFont typeface="Arial" panose="020B0604020202020204" pitchFamily="34" charset="0"/>
-              <a:buChar char="•"/>
-            </a:pPr>
-            <a:r>
-              <a:rPr lang="en-US" b="0" dirty="0"/>
-              <a:t>Function</a:t>
-            </a:r>
-          </a:p>
-          <a:p>
-            <a:pPr marL="647572" lvl="1" indent="-176611">
-              <a:buFont typeface="Arial" panose="020B0604020202020204" pitchFamily="34" charset="0"/>
-              <a:buChar char="•"/>
-            </a:pPr>
-            <a:r>
-              <a:rPr lang="en-US" b="0" dirty="0"/>
-              <a:t>links vs buttons</a:t>
-            </a:r>
-          </a:p>
-          <a:p>
-            <a:pPr marL="647572" lvl="1" indent="-176611">
-              <a:buFont typeface="Arial" panose="020B0604020202020204" pitchFamily="34" charset="0"/>
-              <a:buChar char="•"/>
-            </a:pPr>
-            <a:r>
-              <a:rPr lang="en-US" b="0" dirty="0"/>
-              <a:t>radio vs checkbox</a:t>
-            </a:r>
-          </a:p>
-          <a:p>
-            <a:pPr marL="647572" lvl="1" indent="-176611">
-              <a:buFont typeface="Arial" panose="020B0604020202020204" pitchFamily="34" charset="0"/>
-              <a:buChar char="•"/>
-            </a:pPr>
-            <a:r>
-              <a:rPr lang="en-US" b="0" dirty="0"/>
-              <a:t>special formatting requirements for a field to validate</a:t>
-            </a:r>
-          </a:p>
-          <a:p>
-            <a:pPr marL="647572" lvl="1" indent="-176611">
-              <a:buFont typeface="Arial" panose="020B0604020202020204" pitchFamily="34" charset="0"/>
-              <a:buChar char="•"/>
-            </a:pPr>
-            <a:r>
-              <a:rPr lang="en-US" b="0" dirty="0"/>
-              <a:t>how to access/expand a widget</a:t>
-            </a:r>
-          </a:p>
-          <a:p>
-            <a:pPr marL="647572" lvl="1" indent="-176611">
-              <a:buFont typeface="Arial" panose="020B0604020202020204" pitchFamily="34" charset="0"/>
-              <a:buChar char="•"/>
-            </a:pPr>
-            <a:r>
-              <a:rPr lang="en-US" b="0" dirty="0"/>
-              <a:t>conflict with existing common user key shortcuts</a:t>
-            </a:r>
-          </a:p>
-          <a:p>
-            <a:pPr marL="176611" indent="-176611">
-              <a:buFont typeface="Arial" panose="020B0604020202020204" pitchFamily="34" charset="0"/>
-              <a:buChar char="•"/>
-            </a:pPr>
-            <a:r>
-              <a:rPr lang="en-US" b="0" dirty="0"/>
-              <a:t>Information</a:t>
-            </a:r>
-          </a:p>
-          <a:p>
-            <a:pPr marL="647572" lvl="1" indent="-176611">
-              <a:buFont typeface="Arial" panose="020B0604020202020204" pitchFamily="34" charset="0"/>
-              <a:buChar char="•"/>
-            </a:pPr>
-            <a:r>
-              <a:rPr lang="en-US" b="0" dirty="0"/>
-              <a:t>Not just using color</a:t>
-            </a:r>
-          </a:p>
-          <a:p>
-            <a:pPr marL="647572" lvl="1" indent="-176611">
-              <a:buFont typeface="Arial" panose="020B0604020202020204" pitchFamily="34" charset="0"/>
-              <a:buChar char="•"/>
-            </a:pPr>
-            <a:r>
-              <a:rPr lang="en-US" b="0" dirty="0"/>
-              <a:t>Accessible labeling</a:t>
-            </a:r>
-          </a:p>
-          <a:p>
-            <a:pPr marL="647572" lvl="1" indent="-176611">
-              <a:buFont typeface="Arial" panose="020B0604020202020204" pitchFamily="34" charset="0"/>
-              <a:buChar char="•"/>
-            </a:pPr>
-            <a:r>
-              <a:rPr lang="en-US" b="0" dirty="0"/>
-              <a:t>Proper color contrast</a:t>
-            </a:r>
-          </a:p>
-          <a:p>
-            <a:pPr marL="647572" lvl="1" indent="-176611">
-              <a:buFont typeface="Arial" panose="020B0604020202020204" pitchFamily="34" charset="0"/>
-              <a:buChar char="•"/>
-            </a:pPr>
-            <a:r>
-              <a:rPr lang="en-US" b="0" dirty="0"/>
-              <a:t>CSS images not the only way of conveying information</a:t>
+              <a:rPr lang="en-US" dirty="0"/>
+              <a:t> is most easily thought of as is the environment creating a barrier to certain groups of people that isn’t caused for other groups. In this case, we are not just looking at barriers caused to people with medical conditions, but also people who may be commonly visiting the content while in a state of distress, in an environment where they cannot easily hear audio cues, maybe viewing a screen in a very brightly/dimly lit environment, viewing while on a poor connection, etc.</a:t>
             </a:r>
           </a:p>
         </p:txBody>
@@ -1736,7 +1628,7 @@
           <a:p>
             <a:fld id="{DD82C05A-7A07-4286-AA18-B883C0AF9A3B}" type="slidenum">
               <a:rPr lang="en-US" smtClean="0"/>
-              <a:t>6</a:t>
+              <a:t>5</a:t>
             </a:fld>
             <a:endParaRPr lang="en-US" dirty="0"/>
           </a:p>
@@ -1745,7 +1637,7 @@
     </p:spTree>
     <p:extLst>
       <p:ext uri="{BB962C8B-B14F-4D97-AF65-F5344CB8AC3E}">
-        <p14:creationId xmlns:p14="http://schemas.microsoft.com/office/powerpoint/2010/main" val="2781781227"/>
+        <p14:creationId xmlns:p14="http://schemas.microsoft.com/office/powerpoint/2010/main" val="2208424147"/>
       </p:ext>
     </p:extLst>
   </p:cSld>
@@ -1800,8 +1692,204 @@
           <a:lstStyle/>
           <a:p>
             <a:r>
-              <a:rPr lang="en-US" dirty="0"/>
-              <a:t>Https://corgidev.com/a11y.html</a:t>
+              <a:rPr lang="en-US" b="0" dirty="0"/>
+              <a:t>To that end we are looking at how accurately, clearly, and consistently the content is communicated.</a:t>
+            </a:r>
+          </a:p>
+          <a:p>
+            <a:r>
+              <a:rPr lang="en-US" b="0" dirty="0"/>
+              <a:t>Some of what we are looking at, include:</a:t>
+            </a:r>
+          </a:p>
+          <a:p>
+            <a:pPr marL="176611" indent="-176611">
+              <a:buFont typeface="Arial" panose="020B0604020202020204" pitchFamily="34" charset="0"/>
+              <a:buChar char="•"/>
+            </a:pPr>
+            <a:r>
+              <a:rPr lang="en-US" b="0" dirty="0"/>
+              <a:t>Structure </a:t>
+            </a:r>
+          </a:p>
+          <a:p>
+            <a:pPr marL="647572" lvl="1" indent="-176611">
+              <a:buFont typeface="Arial" panose="020B0604020202020204" pitchFamily="34" charset="0"/>
+              <a:buChar char="•"/>
+            </a:pPr>
+            <a:r>
+              <a:rPr lang="en-US" b="0" dirty="0"/>
+              <a:t>Headings</a:t>
+            </a:r>
+          </a:p>
+          <a:p>
+            <a:pPr marL="647572" lvl="1" indent="-176611">
+              <a:buFont typeface="Arial" panose="020B0604020202020204" pitchFamily="34" charset="0"/>
+              <a:buChar char="•"/>
+            </a:pPr>
+            <a:r>
+              <a:rPr lang="en-US" b="0" dirty="0"/>
+              <a:t>landmark regions (header, main, footer, nav, form, etc.)</a:t>
+            </a:r>
+          </a:p>
+          <a:p>
+            <a:pPr marL="176611" indent="-176611">
+              <a:buFont typeface="Arial" panose="020B0604020202020204" pitchFamily="34" charset="0"/>
+              <a:buChar char="•"/>
+            </a:pPr>
+            <a:r>
+              <a:rPr lang="en-US" b="0" dirty="0"/>
+              <a:t>Relationships</a:t>
+            </a:r>
+          </a:p>
+          <a:p>
+            <a:pPr marL="647572" lvl="1" indent="-176611">
+              <a:buFont typeface="Arial" panose="020B0604020202020204" pitchFamily="34" charset="0"/>
+              <a:buChar char="•"/>
+            </a:pPr>
+            <a:r>
+              <a:rPr lang="en-US" b="0" dirty="0"/>
+              <a:t>heading to its content</a:t>
+            </a:r>
+          </a:p>
+          <a:p>
+            <a:pPr marL="647572" lvl="1" indent="-176611">
+              <a:buFont typeface="Arial" panose="020B0604020202020204" pitchFamily="34" charset="0"/>
+              <a:buChar char="•"/>
+            </a:pPr>
+            <a:r>
+              <a:rPr lang="en-US" b="0" dirty="0"/>
+              <a:t>heading to other headings (not having to headings as H2s even though one is meant to be under the other)</a:t>
+            </a:r>
+          </a:p>
+          <a:p>
+            <a:pPr marL="647572" lvl="1" indent="-176611">
+              <a:buFont typeface="Arial" panose="020B0604020202020204" pitchFamily="34" charset="0"/>
+              <a:buChar char="•"/>
+            </a:pPr>
+            <a:r>
+              <a:rPr lang="en-US" b="0" dirty="0"/>
+              <a:t>label to its input</a:t>
+            </a:r>
+          </a:p>
+          <a:p>
+            <a:pPr marL="647572" lvl="1" indent="-176611">
+              <a:buFont typeface="Arial" panose="020B0604020202020204" pitchFamily="34" charset="0"/>
+              <a:buChar char="•"/>
+            </a:pPr>
+            <a:r>
+              <a:rPr lang="en-US" b="0" dirty="0"/>
+              <a:t>Lists (ordered vs unordered)</a:t>
+            </a:r>
+          </a:p>
+          <a:p>
+            <a:pPr marL="176611" indent="-176611">
+              <a:buFont typeface="Arial" panose="020B0604020202020204" pitchFamily="34" charset="0"/>
+              <a:buChar char="•"/>
+            </a:pPr>
+            <a:r>
+              <a:rPr lang="en-US" b="0" dirty="0"/>
+              <a:t>Function</a:t>
+            </a:r>
+          </a:p>
+          <a:p>
+            <a:pPr marL="647572" lvl="1" indent="-176611">
+              <a:buFont typeface="Arial" panose="020B0604020202020204" pitchFamily="34" charset="0"/>
+              <a:buChar char="•"/>
+            </a:pPr>
+            <a:r>
+              <a:rPr lang="en-US" b="0" dirty="0"/>
+              <a:t>links vs buttons</a:t>
+            </a:r>
+          </a:p>
+          <a:p>
+            <a:pPr marL="647572" lvl="1" indent="-176611">
+              <a:buFont typeface="Arial" panose="020B0604020202020204" pitchFamily="34" charset="0"/>
+              <a:buChar char="•"/>
+            </a:pPr>
+            <a:r>
+              <a:rPr lang="en-US" b="0" dirty="0"/>
+              <a:t>radio vs checkbox</a:t>
+            </a:r>
+          </a:p>
+          <a:p>
+            <a:pPr marL="647572" lvl="1" indent="-176611">
+              <a:buFont typeface="Arial" panose="020B0604020202020204" pitchFamily="34" charset="0"/>
+              <a:buChar char="•"/>
+            </a:pPr>
+            <a:r>
+              <a:rPr lang="en-US" b="0" dirty="0"/>
+              <a:t>special formatting requirements for a field to validate</a:t>
+            </a:r>
+          </a:p>
+          <a:p>
+            <a:pPr marL="647572" lvl="1" indent="-176611">
+              <a:buFont typeface="Arial" panose="020B0604020202020204" pitchFamily="34" charset="0"/>
+              <a:buChar char="•"/>
+            </a:pPr>
+            <a:r>
+              <a:rPr lang="en-US" b="0" dirty="0"/>
+              <a:t>how to access/expand a widget</a:t>
+            </a:r>
+          </a:p>
+          <a:p>
+            <a:pPr marL="647572" lvl="1" indent="-176611">
+              <a:buFont typeface="Arial" panose="020B0604020202020204" pitchFamily="34" charset="0"/>
+              <a:buChar char="•"/>
+            </a:pPr>
+            <a:r>
+              <a:rPr lang="en-US" b="0" dirty="0"/>
+              <a:t>conflict with existing common user key shortcuts</a:t>
+            </a:r>
+          </a:p>
+          <a:p>
+            <a:pPr marL="176611" indent="-176611">
+              <a:buFont typeface="Arial" panose="020B0604020202020204" pitchFamily="34" charset="0"/>
+              <a:buChar char="•"/>
+            </a:pPr>
+            <a:r>
+              <a:rPr lang="en-US" b="0" dirty="0"/>
+              <a:t>Information</a:t>
+            </a:r>
+          </a:p>
+          <a:p>
+            <a:pPr marL="647572" lvl="1" indent="-176611">
+              <a:buFont typeface="Arial" panose="020B0604020202020204" pitchFamily="34" charset="0"/>
+              <a:buChar char="•"/>
+            </a:pPr>
+            <a:r>
+              <a:rPr lang="en-US" b="0" dirty="0"/>
+              <a:t>Not just using color</a:t>
+            </a:r>
+          </a:p>
+          <a:p>
+            <a:pPr marL="647572" lvl="1" indent="-176611">
+              <a:buFont typeface="Arial" panose="020B0604020202020204" pitchFamily="34" charset="0"/>
+              <a:buChar char="•"/>
+            </a:pPr>
+            <a:r>
+              <a:rPr lang="en-US" b="0" dirty="0"/>
+              <a:t>Accessible labeling</a:t>
+            </a:r>
+          </a:p>
+          <a:p>
+            <a:pPr marL="647572" lvl="1" indent="-176611">
+              <a:buFont typeface="Arial" panose="020B0604020202020204" pitchFamily="34" charset="0"/>
+              <a:buChar char="•"/>
+            </a:pPr>
+            <a:r>
+              <a:rPr lang="en-US" b="0" dirty="0"/>
+              <a:t>Proper color contrast</a:t>
+            </a:r>
+          </a:p>
+          <a:p>
+            <a:pPr marL="647572" lvl="1" indent="-176611">
+              <a:buFont typeface="Arial" panose="020B0604020202020204" pitchFamily="34" charset="0"/>
+              <a:buChar char="•"/>
+            </a:pPr>
+            <a:r>
+              <a:rPr lang="en-US" b="0" dirty="0"/>
+              <a:t>CSS images not the only way of conveying information</a:t>
             </a:r>
           </a:p>
         </p:txBody>
@@ -1823,7 +1911,7 @@
           <a:p>
             <a:fld id="{DD82C05A-7A07-4286-AA18-B883C0AF9A3B}" type="slidenum">
               <a:rPr lang="en-US" smtClean="0"/>
-              <a:t>7</a:t>
+              <a:t>6</a:t>
             </a:fld>
             <a:endParaRPr lang="en-US" dirty="0"/>
           </a:p>
@@ -1832,7 +1920,7 @@
     </p:spTree>
     <p:extLst>
       <p:ext uri="{BB962C8B-B14F-4D97-AF65-F5344CB8AC3E}">
-        <p14:creationId xmlns:p14="http://schemas.microsoft.com/office/powerpoint/2010/main" val="2134996900"/>
+        <p14:creationId xmlns:p14="http://schemas.microsoft.com/office/powerpoint/2010/main" val="2781781227"/>
       </p:ext>
     </p:extLst>
   </p:cSld>
@@ -1886,200 +1974,9 @@
           <a:bodyPr/>
           <a:lstStyle/>
           <a:p>
-            <a:pPr marL="235481" indent="-235481">
-              <a:buFont typeface="+mj-lt"/>
-              <a:buAutoNum type="arabicPeriod"/>
-            </a:pPr>
             <a:r>
               <a:rPr lang="en-US" dirty="0"/>
-              <a:t>Header</a:t>
-            </a:r>
-          </a:p>
-          <a:p>
-            <a:pPr marL="706443" lvl="1" indent="-235481">
-              <a:buFont typeface="+mj-lt"/>
-              <a:buAutoNum type="arabicPeriod"/>
-            </a:pPr>
-            <a:r>
-              <a:rPr lang="en-US" dirty="0"/>
-              <a:t>Nav: aria-label=“Main”</a:t>
-            </a:r>
-          </a:p>
-          <a:p>
-            <a:pPr marL="235481" indent="-235481">
-              <a:buFont typeface="+mj-lt"/>
-              <a:buAutoNum type="arabicPeriod"/>
-            </a:pPr>
-            <a:r>
-              <a:rPr lang="en-US" dirty="0"/>
-              <a:t>Nav: aria-label=“Breadcrumbs”</a:t>
-            </a:r>
-          </a:p>
-          <a:p>
-            <a:pPr marL="235481" indent="-235481">
-              <a:buFont typeface="+mj-lt"/>
-              <a:buAutoNum type="arabicPeriod"/>
-            </a:pPr>
-            <a:r>
-              <a:rPr lang="en-US" dirty="0"/>
-              <a:t>Main</a:t>
-            </a:r>
-          </a:p>
-          <a:p>
-            <a:pPr marL="706443" lvl="1" indent="-235481">
-              <a:buFont typeface="+mj-lt"/>
-              <a:buAutoNum type="arabicPeriod"/>
-            </a:pPr>
-            <a:r>
-              <a:rPr lang="en-US" dirty="0"/>
-              <a:t>H1</a:t>
-            </a:r>
-          </a:p>
-          <a:p>
-            <a:pPr marL="1177404" lvl="2" indent="-235481">
-              <a:buFont typeface="+mj-lt"/>
-              <a:buAutoNum type="arabicPeriod"/>
-            </a:pPr>
-            <a:r>
-              <a:rPr lang="en-US" dirty="0"/>
-              <a:t>H2</a:t>
-            </a:r>
-          </a:p>
-          <a:p>
-            <a:pPr marL="1648366" lvl="3" indent="-235481">
-              <a:buFont typeface="+mj-lt"/>
-              <a:buAutoNum type="arabicPeriod"/>
-            </a:pPr>
-            <a:r>
-              <a:rPr lang="en-US" dirty="0"/>
-              <a:t>Button with an aria-expanded attribute</a:t>
-            </a:r>
-          </a:p>
-          <a:p>
-            <a:pPr marL="1177404" lvl="2" indent="-235481" defTabSz="941923">
-              <a:buFont typeface="+mj-lt"/>
-              <a:buAutoNum type="arabicPeriod"/>
-              <a:defRPr/>
-            </a:pPr>
-            <a:r>
-              <a:rPr lang="en-US" dirty="0"/>
-              <a:t>H2</a:t>
-            </a:r>
-          </a:p>
-          <a:p>
-            <a:pPr marL="1648366" lvl="3" indent="-235481" defTabSz="941923">
-              <a:buFont typeface="+mj-lt"/>
-              <a:buAutoNum type="arabicPeriod"/>
-              <a:defRPr/>
-            </a:pPr>
-            <a:r>
-              <a:rPr lang="en-US" dirty="0"/>
-              <a:t>Button with an aria-expanded attribute</a:t>
-            </a:r>
-          </a:p>
-          <a:p>
-            <a:pPr marL="1177404" lvl="2" indent="-235481" defTabSz="941923">
-              <a:buFont typeface="+mj-lt"/>
-              <a:buAutoNum type="arabicPeriod"/>
-              <a:defRPr/>
-            </a:pPr>
-            <a:r>
-              <a:rPr lang="en-US" dirty="0"/>
-              <a:t>H2</a:t>
-            </a:r>
-          </a:p>
-          <a:p>
-            <a:pPr marL="1648366" lvl="3" indent="-235481" defTabSz="941923">
-              <a:buFont typeface="+mj-lt"/>
-              <a:buAutoNum type="arabicPeriod"/>
-              <a:defRPr/>
-            </a:pPr>
-            <a:r>
-              <a:rPr lang="en-US" dirty="0"/>
-              <a:t>Button with an aria-expanded attribute</a:t>
-            </a:r>
-          </a:p>
-          <a:p>
-            <a:pPr marL="1177404" lvl="2" indent="-235481" defTabSz="941923">
-              <a:buFont typeface="+mj-lt"/>
-              <a:buAutoNum type="arabicPeriod"/>
-              <a:defRPr/>
-            </a:pPr>
-            <a:r>
-              <a:rPr lang="en-US" dirty="0"/>
-              <a:t>H2</a:t>
-            </a:r>
-          </a:p>
-          <a:p>
-            <a:pPr marL="1648366" lvl="3" indent="-235481" defTabSz="941923">
-              <a:buFont typeface="+mj-lt"/>
-              <a:buAutoNum type="arabicPeriod"/>
-              <a:defRPr/>
-            </a:pPr>
-            <a:r>
-              <a:rPr lang="en-US" dirty="0"/>
-              <a:t>Button with an aria-expanded attribute</a:t>
-            </a:r>
-          </a:p>
-          <a:p>
-            <a:pPr marL="1177404" lvl="2" indent="-235481">
-              <a:buFont typeface="+mj-lt"/>
-              <a:buAutoNum type="arabicPeriod"/>
-            </a:pPr>
-            <a:r>
-              <a:rPr lang="en-US" dirty="0"/>
-              <a:t>H2</a:t>
-            </a:r>
-          </a:p>
-          <a:p>
-            <a:pPr marL="1648366" lvl="3" indent="-235481">
-              <a:buFont typeface="+mj-lt"/>
-              <a:buAutoNum type="arabicPeriod"/>
-            </a:pPr>
-            <a:r>
-              <a:rPr lang="en-US" dirty="0"/>
-              <a:t>Button with an aria-expanded attribute</a:t>
-            </a:r>
-          </a:p>
-          <a:p>
-            <a:pPr marL="1177404" lvl="2" indent="-235481">
-              <a:buFont typeface="+mj-lt"/>
-              <a:buAutoNum type="arabicPeriod"/>
-            </a:pPr>
-            <a:r>
-              <a:rPr lang="en-US" dirty="0"/>
-              <a:t>H2</a:t>
-            </a:r>
-          </a:p>
-          <a:p>
-            <a:pPr marL="1648366" lvl="3" indent="-235481">
-              <a:buFont typeface="+mj-lt"/>
-              <a:buAutoNum type="arabicPeriod"/>
-            </a:pPr>
-            <a:r>
-              <a:rPr lang="en-US" dirty="0"/>
-              <a:t>Button with an aria-expanded attribute</a:t>
-            </a:r>
-          </a:p>
-          <a:p>
-            <a:pPr marL="235481" indent="-235481">
-              <a:buFont typeface="+mj-lt"/>
-              <a:buAutoNum type="arabicPeriod"/>
-            </a:pPr>
-            <a:r>
-              <a:rPr lang="en-US" dirty="0"/>
-              <a:t>Footer</a:t>
-            </a:r>
-          </a:p>
-          <a:p>
-            <a:pPr marL="706443" lvl="1" indent="-235481" defTabSz="941923">
-              <a:buFont typeface="+mj-lt"/>
-              <a:buAutoNum type="arabicPeriod"/>
-              <a:defRPr/>
-            </a:pPr>
-            <a:r>
-              <a:rPr lang="en-US" dirty="0"/>
-              <a:t>Nav: aria-label=“Social Media”</a:t>
+              <a:t>Https://corgidev.com/a11y.html</a:t>
             </a:r>
           </a:p>
         </p:txBody>
@@ -2101,7 +1998,7 @@
           <a:p>
             <a:fld id="{DD82C05A-7A07-4286-AA18-B883C0AF9A3B}" type="slidenum">
               <a:rPr lang="en-US" smtClean="0"/>
-              <a:t>8</a:t>
+              <a:t>7</a:t>
             </a:fld>
             <a:endParaRPr lang="en-US" dirty="0"/>
           </a:p>
@@ -2110,7 +2007,7 @@
     </p:spTree>
     <p:extLst>
       <p:ext uri="{BB962C8B-B14F-4D97-AF65-F5344CB8AC3E}">
-        <p14:creationId xmlns:p14="http://schemas.microsoft.com/office/powerpoint/2010/main" val="2521631742"/>
+        <p14:creationId xmlns:p14="http://schemas.microsoft.com/office/powerpoint/2010/main" val="2134996900"/>
       </p:ext>
     </p:extLst>
   </p:cSld>
@@ -2164,7 +2061,201 @@
           <a:bodyPr/>
           <a:lstStyle/>
           <a:p>
-            <a:endParaRPr lang="en-US" dirty="0"/>
+            <a:pPr marL="235481" indent="-235481">
+              <a:buFont typeface="+mj-lt"/>
+              <a:buAutoNum type="arabicPeriod"/>
+            </a:pPr>
+            <a:r>
+              <a:rPr lang="en-US" dirty="0"/>
+              <a:t>Header</a:t>
+            </a:r>
+          </a:p>
+          <a:p>
+            <a:pPr marL="706443" lvl="1" indent="-235481">
+              <a:buFont typeface="+mj-lt"/>
+              <a:buAutoNum type="arabicPeriod"/>
+            </a:pPr>
+            <a:r>
+              <a:rPr lang="en-US" dirty="0"/>
+              <a:t>Nav: aria-label=“Main”</a:t>
+            </a:r>
+          </a:p>
+          <a:p>
+            <a:pPr marL="235481" indent="-235481">
+              <a:buFont typeface="+mj-lt"/>
+              <a:buAutoNum type="arabicPeriod"/>
+            </a:pPr>
+            <a:r>
+              <a:rPr lang="en-US" dirty="0"/>
+              <a:t>Nav: aria-label=“Breadcrumbs”</a:t>
+            </a:r>
+          </a:p>
+          <a:p>
+            <a:pPr marL="235481" indent="-235481">
+              <a:buFont typeface="+mj-lt"/>
+              <a:buAutoNum type="arabicPeriod"/>
+            </a:pPr>
+            <a:r>
+              <a:rPr lang="en-US" dirty="0"/>
+              <a:t>Main</a:t>
+            </a:r>
+          </a:p>
+          <a:p>
+            <a:pPr marL="706443" lvl="1" indent="-235481">
+              <a:buFont typeface="+mj-lt"/>
+              <a:buAutoNum type="arabicPeriod"/>
+            </a:pPr>
+            <a:r>
+              <a:rPr lang="en-US" dirty="0"/>
+              <a:t>H1</a:t>
+            </a:r>
+          </a:p>
+          <a:p>
+            <a:pPr marL="1177404" lvl="2" indent="-235481">
+              <a:buFont typeface="+mj-lt"/>
+              <a:buAutoNum type="arabicPeriod"/>
+            </a:pPr>
+            <a:r>
+              <a:rPr lang="en-US" dirty="0"/>
+              <a:t>H2</a:t>
+            </a:r>
+          </a:p>
+          <a:p>
+            <a:pPr marL="1648366" lvl="3" indent="-235481">
+              <a:buFont typeface="+mj-lt"/>
+              <a:buAutoNum type="arabicPeriod"/>
+            </a:pPr>
+            <a:r>
+              <a:rPr lang="en-US" dirty="0"/>
+              <a:t>Button with an aria-expanded attribute</a:t>
+            </a:r>
+          </a:p>
+          <a:p>
+            <a:pPr marL="1177404" lvl="2" indent="-235481" defTabSz="941923">
+              <a:buFont typeface="+mj-lt"/>
+              <a:buAutoNum type="arabicPeriod"/>
+              <a:defRPr/>
+            </a:pPr>
+            <a:r>
+              <a:rPr lang="en-US" dirty="0"/>
+              <a:t>H2</a:t>
+            </a:r>
+          </a:p>
+          <a:p>
+            <a:pPr marL="1648366" lvl="3" indent="-235481" defTabSz="941923">
+              <a:buFont typeface="+mj-lt"/>
+              <a:buAutoNum type="arabicPeriod"/>
+              <a:defRPr/>
+            </a:pPr>
+            <a:r>
+              <a:rPr lang="en-US" dirty="0"/>
+              <a:t>Button with an aria-expanded attribute</a:t>
+            </a:r>
+          </a:p>
+          <a:p>
+            <a:pPr marL="1177404" lvl="2" indent="-235481" defTabSz="941923">
+              <a:buFont typeface="+mj-lt"/>
+              <a:buAutoNum type="arabicPeriod"/>
+              <a:defRPr/>
+            </a:pPr>
+            <a:r>
+              <a:rPr lang="en-US" dirty="0"/>
+              <a:t>H2</a:t>
+            </a:r>
+          </a:p>
+          <a:p>
+            <a:pPr marL="1648366" lvl="3" indent="-235481" defTabSz="941923">
+              <a:buFont typeface="+mj-lt"/>
+              <a:buAutoNum type="arabicPeriod"/>
+              <a:defRPr/>
+            </a:pPr>
+            <a:r>
+              <a:rPr lang="en-US" dirty="0"/>
+              <a:t>Button with an aria-expanded attribute</a:t>
+            </a:r>
+          </a:p>
+          <a:p>
+            <a:pPr marL="1177404" lvl="2" indent="-235481" defTabSz="941923">
+              <a:buFont typeface="+mj-lt"/>
+              <a:buAutoNum type="arabicPeriod"/>
+              <a:defRPr/>
+            </a:pPr>
+            <a:r>
+              <a:rPr lang="en-US" dirty="0"/>
+              <a:t>H2</a:t>
+            </a:r>
+          </a:p>
+          <a:p>
+            <a:pPr marL="1648366" lvl="3" indent="-235481" defTabSz="941923">
+              <a:buFont typeface="+mj-lt"/>
+              <a:buAutoNum type="arabicPeriod"/>
+              <a:defRPr/>
+            </a:pPr>
+            <a:r>
+              <a:rPr lang="en-US" dirty="0"/>
+              <a:t>Button with an aria-expanded attribute</a:t>
+            </a:r>
+          </a:p>
+          <a:p>
+            <a:pPr marL="1177404" lvl="2" indent="-235481">
+              <a:buFont typeface="+mj-lt"/>
+              <a:buAutoNum type="arabicPeriod"/>
+            </a:pPr>
+            <a:r>
+              <a:rPr lang="en-US" dirty="0"/>
+              <a:t>H2</a:t>
+            </a:r>
+          </a:p>
+          <a:p>
+            <a:pPr marL="1648366" lvl="3" indent="-235481">
+              <a:buFont typeface="+mj-lt"/>
+              <a:buAutoNum type="arabicPeriod"/>
+            </a:pPr>
+            <a:r>
+              <a:rPr lang="en-US" dirty="0"/>
+              <a:t>Button with an aria-expanded attribute</a:t>
+            </a:r>
+          </a:p>
+          <a:p>
+            <a:pPr marL="1177404" lvl="2" indent="-235481">
+              <a:buFont typeface="+mj-lt"/>
+              <a:buAutoNum type="arabicPeriod"/>
+            </a:pPr>
+            <a:r>
+              <a:rPr lang="en-US" dirty="0"/>
+              <a:t>H2</a:t>
+            </a:r>
+          </a:p>
+          <a:p>
+            <a:pPr marL="1648366" lvl="3" indent="-235481">
+              <a:buFont typeface="+mj-lt"/>
+              <a:buAutoNum type="arabicPeriod"/>
+            </a:pPr>
+            <a:r>
+              <a:rPr lang="en-US" dirty="0"/>
+              <a:t>Button with an aria-expanded attribute</a:t>
+            </a:r>
+          </a:p>
+          <a:p>
+            <a:pPr marL="235481" indent="-235481">
+              <a:buFont typeface="+mj-lt"/>
+              <a:buAutoNum type="arabicPeriod"/>
+            </a:pPr>
+            <a:r>
+              <a:rPr lang="en-US" dirty="0"/>
+              <a:t>Footer</a:t>
+            </a:r>
+          </a:p>
+          <a:p>
+            <a:pPr marL="706443" lvl="1" indent="-235481" defTabSz="941923">
+              <a:buFont typeface="+mj-lt"/>
+              <a:buAutoNum type="arabicPeriod"/>
+              <a:defRPr/>
+            </a:pPr>
+            <a:r>
+              <a:rPr lang="en-US" dirty="0"/>
+              <a:t>Nav: aria-label=“Social Media”</a:t>
+            </a:r>
           </a:p>
         </p:txBody>
       </p:sp>
@@ -2185,7 +2276,7 @@
           <a:p>
             <a:fld id="{DD82C05A-7A07-4286-AA18-B883C0AF9A3B}" type="slidenum">
               <a:rPr lang="en-US" smtClean="0"/>
-              <a:t>9</a:t>
+              <a:t>8</a:t>
             </a:fld>
             <a:endParaRPr lang="en-US" dirty="0"/>
           </a:p>
@@ -2194,7 +2285,7 @@
     </p:spTree>
     <p:extLst>
       <p:ext uri="{BB962C8B-B14F-4D97-AF65-F5344CB8AC3E}">
-        <p14:creationId xmlns:p14="http://schemas.microsoft.com/office/powerpoint/2010/main" val="2107896696"/>
+        <p14:creationId xmlns:p14="http://schemas.microsoft.com/office/powerpoint/2010/main" val="2521631742"/>
       </p:ext>
     </p:extLst>
   </p:cSld>
@@ -2248,13 +2339,6 @@
           <a:bodyPr/>
           <a:lstStyle/>
           <a:p>
-            <a:pPr defTabSz="941923"/>
-            <a:r>
-              <a:rPr lang="en-US" dirty="0"/>
-              <a:t>Azure Vision Studio - https://portal.vision.cognitive.azure.com/demo/image-captioning</a:t>
-            </a:r>
-          </a:p>
-          <a:p>
             <a:endParaRPr lang="en-US" dirty="0"/>
           </a:p>
         </p:txBody>
@@ -2276,7 +2360,7 @@
           <a:p>
             <a:fld id="{DD82C05A-7A07-4286-AA18-B883C0AF9A3B}" type="slidenum">
               <a:rPr lang="en-US" smtClean="0"/>
-              <a:t>10</a:t>
+              <a:t>9</a:t>
             </a:fld>
             <a:endParaRPr lang="en-US" dirty="0"/>
           </a:p>
@@ -2285,7 +2369,7 @@
     </p:spTree>
     <p:extLst>
       <p:ext uri="{BB962C8B-B14F-4D97-AF65-F5344CB8AC3E}">
-        <p14:creationId xmlns:p14="http://schemas.microsoft.com/office/powerpoint/2010/main" val="3221064947"/>
+        <p14:creationId xmlns:p14="http://schemas.microsoft.com/office/powerpoint/2010/main" val="2107896696"/>
       </p:ext>
     </p:extLst>
   </p:cSld>
@@ -29288,7 +29372,7 @@
           <p:nvPr/>
         </p:nvPicPr>
         <p:blipFill>
-          <a:blip r:embed="rId2"/>
+          <a:blip r:embed="rId3"/>
           <a:stretch>
             <a:fillRect/>
           </a:stretch>
@@ -29353,7 +29437,7 @@
           <p:nvPr/>
         </p:nvPicPr>
         <p:blipFill>
-          <a:blip r:embed="rId3">
+          <a:blip r:embed="rId4">
             <a:extLst>
               <a:ext uri="{28A0092B-C50C-407E-A947-70E740481C1C}">
                 <a14:useLocalDpi xmlns:a14="http://schemas.microsoft.com/office/drawing/2010/main" val="0"/>
@@ -29389,7 +29473,7 @@
           <p:nvPr/>
         </p:nvPicPr>
         <p:blipFill>
-          <a:blip r:embed="rId4">
+          <a:blip r:embed="rId5">
             <a:extLst>
               <a:ext uri="{28A0092B-C50C-407E-A947-70E740481C1C}">
                 <a14:useLocalDpi xmlns:a14="http://schemas.microsoft.com/office/drawing/2010/main" val="0"/>
@@ -29430,7 +29514,7 @@
           <p:nvPr/>
         </p:nvPicPr>
         <p:blipFill rotWithShape="1">
-          <a:blip r:embed="rId5">
+          <a:blip r:embed="rId6">
             <a:extLst>
               <a:ext uri="{28A0092B-C50C-407E-A947-70E740481C1C}">
                 <a14:useLocalDpi xmlns:a14="http://schemas.microsoft.com/office/drawing/2010/main" val="0"/>
@@ -29509,7 +29593,7 @@
           <p:nvPr/>
         </p:nvPicPr>
         <p:blipFill rotWithShape="1">
-          <a:blip r:embed="rId6">
+          <a:blip r:embed="rId7">
             <a:extLst>
               <a:ext uri="{28A0092B-C50C-407E-A947-70E740481C1C}">
                 <a14:useLocalDpi xmlns:a14="http://schemas.microsoft.com/office/drawing/2010/main" val="0"/>
@@ -29553,7 +29637,7 @@
           <p:nvPr/>
         </p:nvPicPr>
         <p:blipFill>
-          <a:blip r:embed="rId7">
+          <a:blip r:embed="rId8">
             <a:extLst>
               <a:ext uri="{28A0092B-C50C-407E-A947-70E740481C1C}">
                 <a14:useLocalDpi xmlns:a14="http://schemas.microsoft.com/office/drawing/2010/main" val="0"/>
@@ -29591,7 +29675,7 @@
           <p:nvPr/>
         </p:nvPicPr>
         <p:blipFill>
-          <a:blip r:embed="rId8">
+          <a:blip r:embed="rId9">
             <a:extLst>
               <a:ext uri="{28A0092B-C50C-407E-A947-70E740481C1C}">
                 <a14:useLocalDpi xmlns:a14="http://schemas.microsoft.com/office/drawing/2010/main" val="0"/>
@@ -29664,7 +29748,7 @@
           <p:nvPr/>
         </p:nvPicPr>
         <p:blipFill>
-          <a:blip r:embed="rId9">
+          <a:blip r:embed="rId10">
             <a:extLst>
               <a:ext uri="{28A0092B-C50C-407E-A947-70E740481C1C}">
                 <a14:useLocalDpi xmlns:a14="http://schemas.microsoft.com/office/drawing/2010/main" val="0"/>
@@ -29705,7 +29789,7 @@
           <p:nvPr/>
         </p:nvPicPr>
         <p:blipFill>
-          <a:blip r:embed="rId10">
+          <a:blip r:embed="rId11">
             <a:extLst>
               <a:ext uri="{28A0092B-C50C-407E-A947-70E740481C1C}">
                 <a14:useLocalDpi xmlns:a14="http://schemas.microsoft.com/office/drawing/2010/main" val="0"/>
@@ -29815,6 +29899,36 @@
           </a:p>
         </p:txBody>
       </p:sp>
+      <p:pic>
+        <p:nvPicPr>
+          <p:cNvPr id="3" name="Picture 2" descr="Copyright 2024 - Agile Conferences, Inc.">
+            <a:extLst>
+              <a:ext uri="{FF2B5EF4-FFF2-40B4-BE49-F238E27FC236}">
+                <a16:creationId xmlns:a16="http://schemas.microsoft.com/office/drawing/2014/main" id="{522925CA-DEAC-1433-1250-5B3EFD1D94CF}"/>
+              </a:ext>
+            </a:extLst>
+          </p:cNvPr>
+          <p:cNvPicPr>
+            <a:picLocks noChangeAspect="1"/>
+          </p:cNvPicPr>
+          <p:nvPr/>
+        </p:nvPicPr>
+        <p:blipFill>
+          <a:blip r:embed="rId12"/>
+          <a:stretch>
+            <a:fillRect/>
+          </a:stretch>
+        </p:blipFill>
+        <p:spPr>
+          <a:xfrm>
+            <a:off x="9288570" y="5656052"/>
+            <a:ext cx="2408129" cy="167655"/>
+          </a:xfrm>
+          <a:prstGeom prst="rect">
+            <a:avLst/>
+          </a:prstGeom>
+        </p:spPr>
+      </p:pic>
     </p:spTree>
     <p:extLst>
       <p:ext uri="{BB962C8B-B14F-4D97-AF65-F5344CB8AC3E}">
@@ -32363,35 +32477,6 @@
 </file>
 
 <file path=customXml/item1.xml><?xml version="1.0" encoding="utf-8"?>
-<?mso-contentType ?>
-<FormTemplates xmlns="http://schemas.microsoft.com/sharepoint/v3/contenttype/forms">
-  <Display>DocumentLibraryForm</Display>
-  <Edit>DocumentLibraryForm</Edit>
-  <New>DocumentLibraryForm</New>
-</FormTemplates>
-</file>
-
-<file path=customXml/item2.xml><?xml version="1.0" encoding="utf-8"?>
-<p:properties xmlns:p="http://schemas.microsoft.com/office/2006/metadata/properties" xmlns:xsi="http://www.w3.org/2001/XMLSchema-instance" xmlns:pc="http://schemas.microsoft.com/office/infopath/2007/PartnerControls">
-  <documentManagement>
-    <_ip_UnifiedCompliancePolicyUIAction xmlns="http://schemas.microsoft.com/sharepoint/v3" xsi:nil="true"/>
-    <Image xmlns="71af3243-3dd4-4a8d-8c0d-dd76da1f02a5">
-      <Url xsi:nil="true"/>
-      <Description xsi:nil="true"/>
-    </Image>
-    <Status xmlns="71af3243-3dd4-4a8d-8c0d-dd76da1f02a5">Not started</Status>
-    <Background xmlns="71af3243-3dd4-4a8d-8c0d-dd76da1f02a5">false</Background>
-    <_ip_UnifiedCompliancePolicyProperties xmlns="http://schemas.microsoft.com/sharepoint/v3" xsi:nil="true"/>
-    <ImageTagsTaxHTField xmlns="71af3243-3dd4-4a8d-8c0d-dd76da1f02a5">
-      <Terms xmlns="http://schemas.microsoft.com/office/infopath/2007/PartnerControls"/>
-    </ImageTagsTaxHTField>
-    <TaxCatchAll xmlns="230e9df3-be65-4c73-a93b-d1236ebd677e" xsi:nil="true"/>
-    <MediaServiceKeyPoints xmlns="71af3243-3dd4-4a8d-8c0d-dd76da1f02a5" xsi:nil="true"/>
-  </documentManagement>
-</p:properties>
-</file>
-
-<file path=customXml/item3.xml><?xml version="1.0" encoding="utf-8"?>
 <ct:contentTypeSchema xmlns:ct="http://schemas.microsoft.com/office/2006/metadata/contentType" xmlns:ma="http://schemas.microsoft.com/office/2006/metadata/properties/metaAttributes" ct:_="" ma:_="" ma:contentTypeName="Document" ma:contentTypeID="0x01010079F111ED35F8CC479449609E8A0923A6" ma:contentTypeVersion="28" ma:contentTypeDescription="Create a new document." ma:contentTypeScope="" ma:versionID="60f5a4f2d2b0abadcf532d48ebf9cb71">
   <xsd:schema xmlns:xsd="http://www.w3.org/2001/XMLSchema" xmlns:xs="http://www.w3.org/2001/XMLSchema" xmlns:p="http://schemas.microsoft.com/office/2006/metadata/properties" xmlns:ns1="http://schemas.microsoft.com/sharepoint/v3" xmlns:ns2="71af3243-3dd4-4a8d-8c0d-dd76da1f02a5" xmlns:ns3="16c05727-aa75-4e4a-9b5f-8a80a1165891" xmlns:ns4="230e9df3-be65-4c73-a93b-d1236ebd677e" targetNamespace="http://schemas.microsoft.com/office/2006/metadata/properties" ma:root="true" ma:fieldsID="7dd78129e6a1811f84807ad11c651531" ns1:_="" ns2:_="" ns3:_="" ns4:_="">
     <xsd:import namespace="http://schemas.microsoft.com/sharepoint/v3"/>
@@ -32703,10 +32788,52 @@
 </ct:contentTypeSchema>
 </file>
 
+<file path=customXml/item2.xml><?xml version="1.0" encoding="utf-8"?>
+<p:properties xmlns:p="http://schemas.microsoft.com/office/2006/metadata/properties" xmlns:xsi="http://www.w3.org/2001/XMLSchema-instance" xmlns:pc="http://schemas.microsoft.com/office/infopath/2007/PartnerControls">
+  <documentManagement>
+    <_ip_UnifiedCompliancePolicyUIAction xmlns="http://schemas.microsoft.com/sharepoint/v3" xsi:nil="true"/>
+    <Image xmlns="71af3243-3dd4-4a8d-8c0d-dd76da1f02a5">
+      <Url xsi:nil="true"/>
+      <Description xsi:nil="true"/>
+    </Image>
+    <Status xmlns="71af3243-3dd4-4a8d-8c0d-dd76da1f02a5">Not started</Status>
+    <Background xmlns="71af3243-3dd4-4a8d-8c0d-dd76da1f02a5">false</Background>
+    <_ip_UnifiedCompliancePolicyProperties xmlns="http://schemas.microsoft.com/sharepoint/v3" xsi:nil="true"/>
+    <ImageTagsTaxHTField xmlns="71af3243-3dd4-4a8d-8c0d-dd76da1f02a5">
+      <Terms xmlns="http://schemas.microsoft.com/office/infopath/2007/PartnerControls"/>
+    </ImageTagsTaxHTField>
+    <TaxCatchAll xmlns="230e9df3-be65-4c73-a93b-d1236ebd677e" xsi:nil="true"/>
+    <MediaServiceKeyPoints xmlns="71af3243-3dd4-4a8d-8c0d-dd76da1f02a5" xsi:nil="true"/>
+  </documentManagement>
+</p:properties>
+</file>
+
+<file path=customXml/item3.xml><?xml version="1.0" encoding="utf-8"?>
+<?mso-contentType ?>
+<FormTemplates xmlns="http://schemas.microsoft.com/sharepoint/v3/contenttype/forms">
+  <Display>DocumentLibraryForm</Display>
+  <Edit>DocumentLibraryForm</Edit>
+  <New>DocumentLibraryForm</New>
+</FormTemplates>
+</file>
+
 <file path=customXml/itemProps1.xml><?xml version="1.0" encoding="utf-8"?>
-<ds:datastoreItem xmlns:ds="http://schemas.openxmlformats.org/officeDocument/2006/customXml" ds:itemID="{E6C52E68-191B-4883-A1EE-52F93DB694AA}">
+<ds:datastoreItem xmlns:ds="http://schemas.openxmlformats.org/officeDocument/2006/customXml" ds:itemID="{16095F90-A7E0-4DA0-8E95-EB34584D62EC}">
   <ds:schemaRefs>
-    <ds:schemaRef ds:uri="http://schemas.microsoft.com/sharepoint/v3/contenttype/forms"/>
+    <ds:schemaRef ds:uri="http://schemas.microsoft.com/office/2006/metadata/contentType"/>
+    <ds:schemaRef ds:uri="http://schemas.microsoft.com/office/2006/metadata/properties/metaAttributes"/>
+    <ds:schemaRef ds:uri="http://www.w3.org/2001/XMLSchema"/>
+    <ds:schemaRef ds:uri="http://schemas.microsoft.com/office/2006/metadata/properties"/>
+    <ds:schemaRef ds:uri="http://schemas.microsoft.com/sharepoint/v3"/>
+    <ds:schemaRef ds:uri="71af3243-3dd4-4a8d-8c0d-dd76da1f02a5"/>
+    <ds:schemaRef ds:uri="16c05727-aa75-4e4a-9b5f-8a80a1165891"/>
+    <ds:schemaRef ds:uri="230e9df3-be65-4c73-a93b-d1236ebd677e"/>
+    <ds:schemaRef ds:uri="http://schemas.microsoft.com/office/2006/documentManagement/types"/>
+    <ds:schemaRef ds:uri="http://schemas.microsoft.com/office/infopath/2007/PartnerControls"/>
+    <ds:schemaRef ds:uri="http://schemas.openxmlformats.org/package/2006/metadata/core-properties"/>
+    <ds:schemaRef ds:uri="http://purl.org/dc/elements/1.1/"/>
+    <ds:schemaRef ds:uri="http://purl.org/dc/terms/"/>
+    <ds:schemaRef ds:uri="http://schemas.microsoft.com/internal/obd"/>
   </ds:schemaRefs>
 </ds:datastoreItem>
 </file>
@@ -32731,22 +32858,9 @@
 </file>
 
 <file path=customXml/itemProps3.xml><?xml version="1.0" encoding="utf-8"?>
-<ds:datastoreItem xmlns:ds="http://schemas.openxmlformats.org/officeDocument/2006/customXml" ds:itemID="{16095F90-A7E0-4DA0-8E95-EB34584D62EC}">
+<ds:datastoreItem xmlns:ds="http://schemas.openxmlformats.org/officeDocument/2006/customXml" ds:itemID="{E6C52E68-191B-4883-A1EE-52F93DB694AA}">
   <ds:schemaRefs>
-    <ds:schemaRef ds:uri="http://schemas.microsoft.com/office/2006/metadata/contentType"/>
-    <ds:schemaRef ds:uri="http://schemas.microsoft.com/office/2006/metadata/properties/metaAttributes"/>
-    <ds:schemaRef ds:uri="http://www.w3.org/2001/XMLSchema"/>
-    <ds:schemaRef ds:uri="http://schemas.microsoft.com/office/2006/metadata/properties"/>
-    <ds:schemaRef ds:uri="http://schemas.microsoft.com/sharepoint/v3"/>
-    <ds:schemaRef ds:uri="71af3243-3dd4-4a8d-8c0d-dd76da1f02a5"/>
-    <ds:schemaRef ds:uri="16c05727-aa75-4e4a-9b5f-8a80a1165891"/>
-    <ds:schemaRef ds:uri="230e9df3-be65-4c73-a93b-d1236ebd677e"/>
-    <ds:schemaRef ds:uri="http://schemas.microsoft.com/office/2006/documentManagement/types"/>
-    <ds:schemaRef ds:uri="http://schemas.microsoft.com/office/infopath/2007/PartnerControls"/>
-    <ds:schemaRef ds:uri="http://schemas.openxmlformats.org/package/2006/metadata/core-properties"/>
-    <ds:schemaRef ds:uri="http://purl.org/dc/elements/1.1/"/>
-    <ds:schemaRef ds:uri="http://purl.org/dc/terms/"/>
-    <ds:schemaRef ds:uri="http://schemas.microsoft.com/internal/obd"/>
+    <ds:schemaRef ds:uri="http://schemas.microsoft.com/sharepoint/v3/contenttype/forms"/>
   </ds:schemaRefs>
 </ds:datastoreItem>
 </file>

</xml_diff>